<commit_message>
Update on Poster and Report
</commit_message>
<xml_diff>
--- a/Documentation/Capstone Project - Poster.pptx
+++ b/Documentation/Capstone Project - Poster.pptx
@@ -197,7 +197,7 @@
 <file path=ppt/revisionInfo.xml><?xml version="1.0" encoding="utf-8"?>
 <p1510:revInfo xmlns:a="http://schemas.openxmlformats.org/drawingml/2006/main" xmlns:r="http://schemas.openxmlformats.org/officeDocument/2006/relationships" xmlns:p1510="http://schemas.microsoft.com/office/powerpoint/2015/10/main">
   <p1510:revLst>
-    <p1510:client id="{1CFC6E96-CD92-DB7E-9D97-D911CCA9C7FA}" v="3027" dt="2024-05-11T17:32:59.060"/>
+    <p1510:client id="{1CFC6E96-CD92-DB7E-9D97-D911CCA9C7FA}" v="4704" dt="2024-05-11T23:09:59.335"/>
     <p1510:client id="{4F9C0DA7-252C-B555-86BC-A86E3FD9C9EE}" v="189" dt="2024-05-10T11:34:28.435"/>
     <p1510:client id="{53463F5A-0479-804E-3D88-BB5129ECB863}" v="151" dt="2024-05-10T01:14:26.736"/>
     <p1510:client id="{B23F6A55-9272-0C13-A53B-F52E05C60F66}" v="3053" dt="2024-05-10T17:07:12.593"/>
@@ -379,12 +379,12 @@
   <pc:docChgLst>
     <pc:chgData name="Ingrid Castro" userId="73b8d72571d56733" providerId="Windows Live" clId="Web-{1CFC6E96-CD92-DB7E-9D97-D911CCA9C7FA}"/>
     <pc:docChg chg="addSld delSld modSld">
-      <pc:chgData name="Ingrid Castro" userId="73b8d72571d56733" providerId="Windows Live" clId="Web-{1CFC6E96-CD92-DB7E-9D97-D911CCA9C7FA}" dt="2024-05-11T17:32:59.060" v="1814" actId="20577"/>
+      <pc:chgData name="Ingrid Castro" userId="73b8d72571d56733" providerId="Windows Live" clId="Web-{1CFC6E96-CD92-DB7E-9D97-D911CCA9C7FA}" dt="2024-05-11T23:09:59.335" v="2849" actId="20577"/>
       <pc:docMkLst>
         <pc:docMk/>
       </pc:docMkLst>
       <pc:sldChg chg="addSp delSp modSp">
-        <pc:chgData name="Ingrid Castro" userId="73b8d72571d56733" providerId="Windows Live" clId="Web-{1CFC6E96-CD92-DB7E-9D97-D911CCA9C7FA}" dt="2024-05-11T17:32:59.060" v="1814" actId="20577"/>
+        <pc:chgData name="Ingrid Castro" userId="73b8d72571d56733" providerId="Windows Live" clId="Web-{1CFC6E96-CD92-DB7E-9D97-D911CCA9C7FA}" dt="2024-05-11T23:09:59.335" v="2849" actId="20577"/>
         <pc:sldMkLst>
           <pc:docMk/>
           <pc:sldMk cId="3160527046" sldId="258"/>
@@ -429,12 +429,28 @@
             <ac:spMk id="8" creationId="{00000000-0000-0000-0000-000000000000}"/>
           </ac:spMkLst>
         </pc:spChg>
+        <pc:spChg chg="mod">
+          <ac:chgData name="Ingrid Castro" userId="73b8d72571d56733" providerId="Windows Live" clId="Web-{1CFC6E96-CD92-DB7E-9D97-D911CCA9C7FA}" dt="2024-05-11T22:46:25.472" v="2726" actId="1076"/>
+          <ac:spMkLst>
+            <pc:docMk/>
+            <pc:sldMk cId="3160527046" sldId="258"/>
+            <ac:spMk id="9" creationId="{00000000-0000-0000-0000-000000000000}"/>
+          </ac:spMkLst>
+        </pc:spChg>
         <pc:spChg chg="add mod">
           <ac:chgData name="Ingrid Castro" userId="73b8d72571d56733" providerId="Windows Live" clId="Web-{1CFC6E96-CD92-DB7E-9D97-D911CCA9C7FA}" dt="2024-05-11T13:25:24.415" v="1163" actId="1076"/>
           <ac:spMkLst>
             <pc:docMk/>
             <pc:sldMk cId="3160527046" sldId="258"/>
             <ac:spMk id="10" creationId="{71394AFA-DEE0-9F5A-4D01-797126D045CF}"/>
+          </ac:spMkLst>
+        </pc:spChg>
+        <pc:spChg chg="mod">
+          <ac:chgData name="Ingrid Castro" userId="73b8d72571d56733" providerId="Windows Live" clId="Web-{1CFC6E96-CD92-DB7E-9D97-D911CCA9C7FA}" dt="2024-05-11T22:46:07.644" v="2723" actId="1076"/>
+          <ac:spMkLst>
+            <pc:docMk/>
+            <pc:sldMk cId="3160527046" sldId="258"/>
+            <ac:spMk id="11" creationId="{00000000-0000-0000-0000-000000000000}"/>
           </ac:spMkLst>
         </pc:spChg>
         <pc:spChg chg="mod">
@@ -486,7 +502,7 @@
           </ac:spMkLst>
         </pc:spChg>
         <pc:spChg chg="add mod">
-          <ac:chgData name="Ingrid Castro" userId="73b8d72571d56733" providerId="Windows Live" clId="Web-{1CFC6E96-CD92-DB7E-9D97-D911CCA9C7FA}" dt="2024-05-11T17:32:59.060" v="1814" actId="20577"/>
+          <ac:chgData name="Ingrid Castro" userId="73b8d72571d56733" providerId="Windows Live" clId="Web-{1CFC6E96-CD92-DB7E-9D97-D911CCA9C7FA}" dt="2024-05-11T21:25:12.806" v="1826" actId="20577"/>
           <ac:spMkLst>
             <pc:docMk/>
             <pc:sldMk cId="3160527046" sldId="258"/>
@@ -509,6 +525,22 @@
             <ac:spMk id="21" creationId="{2FAAC147-C3CF-17EA-1A45-90FB1DFB55CE}"/>
           </ac:spMkLst>
         </pc:spChg>
+        <pc:spChg chg="add mod">
+          <ac:chgData name="Ingrid Castro" userId="73b8d72571d56733" providerId="Windows Live" clId="Web-{1CFC6E96-CD92-DB7E-9D97-D911CCA9C7FA}" dt="2024-05-11T21:25:56.917" v="1838" actId="20577"/>
+          <ac:spMkLst>
+            <pc:docMk/>
+            <pc:sldMk cId="3160527046" sldId="258"/>
+            <ac:spMk id="22" creationId="{F34DA761-C085-E013-6E1A-E77DA63F9F98}"/>
+          </ac:spMkLst>
+        </pc:spChg>
+        <pc:spChg chg="add mod">
+          <ac:chgData name="Ingrid Castro" userId="73b8d72571d56733" providerId="Windows Live" clId="Web-{1CFC6E96-CD92-DB7E-9D97-D911CCA9C7FA}" dt="2024-05-11T21:38:10.081" v="2168"/>
+          <ac:spMkLst>
+            <pc:docMk/>
+            <pc:sldMk cId="3160527046" sldId="258"/>
+            <ac:spMk id="23" creationId="{8C3BB717-4A20-4104-27D7-2AD6D8759B57}"/>
+          </ac:spMkLst>
+        </pc:spChg>
         <pc:spChg chg="add del mod">
           <ac:chgData name="Ingrid Castro" userId="73b8d72571d56733" providerId="Windows Live" clId="Web-{1CFC6E96-CD92-DB7E-9D97-D911CCA9C7FA}" dt="2024-05-11T13:18:37.542" v="1097"/>
           <ac:spMkLst>
@@ -517,12 +549,28 @@
             <ac:spMk id="24" creationId="{36798CB1-2FE8-75DD-1E59-231DEAFE1AAE}"/>
           </ac:spMkLst>
         </pc:spChg>
+        <pc:spChg chg="add mod">
+          <ac:chgData name="Ingrid Castro" userId="73b8d72571d56733" providerId="Windows Live" clId="Web-{1CFC6E96-CD92-DB7E-9D97-D911CCA9C7FA}" dt="2024-05-11T23:09:04.224" v="2831" actId="20577"/>
+          <ac:spMkLst>
+            <pc:docMk/>
+            <pc:sldMk cId="3160527046" sldId="258"/>
+            <ac:spMk id="24" creationId="{F09696AB-DE5E-1719-E147-0DE2864FE37B}"/>
+          </ac:spMkLst>
+        </pc:spChg>
         <pc:spChg chg="del">
           <ac:chgData name="Ingrid Castro" userId="73b8d72571d56733" providerId="Windows Live" clId="Web-{1CFC6E96-CD92-DB7E-9D97-D911CCA9C7FA}" dt="2024-05-11T10:33:52.843" v="11"/>
           <ac:spMkLst>
             <pc:docMk/>
             <pc:sldMk cId="3160527046" sldId="258"/>
             <ac:spMk id="27" creationId="{00000000-0000-0000-0000-000000000000}"/>
+          </ac:spMkLst>
+        </pc:spChg>
+        <pc:spChg chg="add mod">
+          <ac:chgData name="Ingrid Castro" userId="73b8d72571d56733" providerId="Windows Live" clId="Web-{1CFC6E96-CD92-DB7E-9D97-D911CCA9C7FA}" dt="2024-05-11T23:09:59.335" v="2849" actId="20577"/>
+          <ac:spMkLst>
+            <pc:docMk/>
+            <pc:sldMk cId="3160527046" sldId="258"/>
+            <ac:spMk id="27" creationId="{457DB4A5-0DC3-5E50-25F8-EEEFFA69FD50}"/>
           </ac:spMkLst>
         </pc:spChg>
         <pc:spChg chg="add del mod">
@@ -621,6 +669,14 @@
             <ac:spMk id="41" creationId="{00000000-0000-0000-0000-000000000000}"/>
           </ac:spMkLst>
         </pc:spChg>
+        <pc:spChg chg="mod">
+          <ac:chgData name="Ingrid Castro" userId="73b8d72571d56733" providerId="Windows Live" clId="Web-{1CFC6E96-CD92-DB7E-9D97-D911CCA9C7FA}" dt="2024-05-11T22:46:13.347" v="2724" actId="1076"/>
+          <ac:spMkLst>
+            <pc:docMk/>
+            <pc:sldMk cId="3160527046" sldId="258"/>
+            <ac:spMk id="42" creationId="{00000000-0000-0000-0000-000000000000}"/>
+          </ac:spMkLst>
+        </pc:spChg>
         <pc:spChg chg="add del mod">
           <ac:chgData name="Ingrid Castro" userId="73b8d72571d56733" providerId="Windows Live" clId="Web-{1CFC6E96-CD92-DB7E-9D97-D911CCA9C7FA}" dt="2024-05-11T13:18:33.229" v="1095"/>
           <ac:spMkLst>
@@ -643,6 +699,14 @@
             <pc:docMk/>
             <pc:sldMk cId="3160527046" sldId="258"/>
             <ac:spMk id="46" creationId="{BA7BC14E-5C68-4BFC-B8B8-A1CD9BF3BFC9}"/>
+          </ac:spMkLst>
+        </pc:spChg>
+        <pc:spChg chg="mod">
+          <ac:chgData name="Ingrid Castro" userId="73b8d72571d56733" providerId="Windows Live" clId="Web-{1CFC6E96-CD92-DB7E-9D97-D911CCA9C7FA}" dt="2024-05-11T22:46:03.628" v="2722" actId="1076"/>
+          <ac:spMkLst>
+            <pc:docMk/>
+            <pc:sldMk cId="3160527046" sldId="258"/>
+            <ac:spMk id="47" creationId="{C12A8FE5-E10F-498E-9E7D-EC629905A877}"/>
           </ac:spMkLst>
         </pc:spChg>
         <pc:spChg chg="add mod">
@@ -691,6 +755,14 @@
             <pc:docMk/>
             <pc:sldMk cId="3160527046" sldId="258"/>
             <ac:picMk id="22" creationId="{28B12B5F-075A-ABFC-3DF7-2AA4A6C09B89}"/>
+          </ac:picMkLst>
+        </pc:picChg>
+        <pc:picChg chg="add mod">
+          <ac:chgData name="Ingrid Castro" userId="73b8d72571d56733" providerId="Windows Live" clId="Web-{1CFC6E96-CD92-DB7E-9D97-D911CCA9C7FA}" dt="2024-05-11T23:09:09.130" v="2833" actId="1076"/>
+          <ac:picMkLst>
+            <pc:docMk/>
+            <pc:sldMk cId="3160527046" sldId="258"/>
+            <ac:picMk id="26" creationId="{2F68D4EE-63B4-B304-F1DF-2719624F6DC5}"/>
           </ac:picMkLst>
         </pc:picChg>
         <pc:picChg chg="add del mod">
@@ -15196,7 +15268,7 @@
         </p:nvSpPr>
         <p:spPr>
           <a:xfrm>
-            <a:off x="33346443" y="21931197"/>
+            <a:off x="33398202" y="25053959"/>
             <a:ext cx="10047018" cy="677100"/>
           </a:xfrm>
         </p:spPr>
@@ -15229,7 +15301,7 @@
         </p:nvSpPr>
         <p:spPr>
           <a:xfrm>
-            <a:off x="33392567" y="28504101"/>
+            <a:off x="33375314" y="30367407"/>
             <a:ext cx="10047018" cy="754045"/>
           </a:xfrm>
         </p:spPr>
@@ -16038,15 +16110,15 @@
         </p:nvSpPr>
         <p:spPr>
           <a:xfrm>
-            <a:off x="33513137" y="22823005"/>
-            <a:ext cx="9736942" cy="5408649"/>
+            <a:off x="33564895" y="25721480"/>
+            <a:ext cx="9667932" cy="4649525"/>
           </a:xfrm>
           <a:prstGeom prst="rect">
             <a:avLst/>
           </a:prstGeom>
         </p:spPr>
         <p:txBody>
-          <a:bodyPr>
+          <a:bodyPr lIns="91440" tIns="45720" rIns="91440" bIns="45720" anchor="t">
             <a:noAutofit/>
           </a:bodyPr>
           <a:lstStyle>
@@ -16188,138 +16260,40 @@
           </a:lstStyle>
           <a:p>
             <a:pPr marL="0" indent="0" algn="just" defTabSz="895350">
-              <a:buFont typeface="Arial" pitchFamily="34" charset="0"/>
               <a:buNone/>
             </a:pPr>
             <a:r>
               <a:rPr lang="en-IE" sz="2400" dirty="0">
-                <a:latin typeface="Arial" panose="020B0604020202020204" pitchFamily="34" charset="0"/>
-                <a:cs typeface="Arial" panose="020B0604020202020204" pitchFamily="34" charset="0"/>
+                <a:latin typeface="Arial"/>
+                <a:cs typeface="Arial"/>
               </a:rPr>
-              <a:t>A summarised answer to the research questions are presented below:</a:t>
+              <a:t>As a reflection of our overall project development we can say that both objectives were reached and we were able not only to provide the source code for our system (including multiple trained models), but also a User Interface that is able to show the real life usage of the system. </a:t>
             </a:r>
           </a:p>
           <a:p>
             <a:pPr marL="0" indent="0" algn="just" defTabSz="895350">
-              <a:buFont typeface="Arial" pitchFamily="34" charset="0"/>
               <a:buNone/>
             </a:pPr>
-            <a:endParaRPr lang="en-IE" sz="1000" dirty="0">
+            <a:endParaRPr lang="en-IE" sz="2400" dirty="0">
               <a:latin typeface="Arial" panose="020B0604020202020204" pitchFamily="34" charset="0"/>
               <a:cs typeface="Arial" panose="020B0604020202020204" pitchFamily="34" charset="0"/>
             </a:endParaRPr>
           </a:p>
           <a:p>
-            <a:pPr marL="0" indent="0" defTabSz="895350">
-              <a:buFont typeface="Arial" pitchFamily="34" charset="0"/>
+            <a:pPr marL="0" indent="0" algn="just" defTabSz="895350">
               <a:buNone/>
             </a:pPr>
             <a:r>
-              <a:rPr lang="en-IE" sz="2200" b="1" dirty="0">
-                <a:latin typeface="Arial" panose="020B0604020202020204" pitchFamily="34" charset="0"/>
-                <a:cs typeface="Arial" panose="020B0604020202020204" pitchFamily="34" charset="0"/>
+              <a:rPr lang="en-IE" sz="2400" dirty="0">
+                <a:latin typeface="Arial"/>
+                <a:cs typeface="Arial"/>
               </a:rPr>
-              <a:t>Q.1.</a:t>
+              <a:t>The project amplified our understanding of the technologies used and explored an alternative approach to this task, since there are many available. The CRISP-DM methodology helped us structuring our research and development steps, as well as made it easier for us to set internal deadlines for certain phases that required more or less time to be completed.</a:t>
             </a:r>
-            <a:r>
-              <a:rPr lang="en-IE" sz="2200" dirty="0">
-                <a:latin typeface="Arial" panose="020B0604020202020204" pitchFamily="34" charset="0"/>
-                <a:cs typeface="Arial" panose="020B0604020202020204" pitchFamily="34" charset="0"/>
-              </a:rPr>
-              <a:t> 	</a:t>
-            </a:r>
-            <a:r>
-              <a:rPr lang="en-IE" sz="2200" i="1" dirty="0">
-                <a:latin typeface="Arial" panose="020B0604020202020204" pitchFamily="34" charset="0"/>
-                <a:cs typeface="Arial" panose="020B0604020202020204" pitchFamily="34" charset="0"/>
-              </a:rPr>
-              <a:t>Both of the studies on the use of a reflective learning journal were 	mostly negative, in that students did not find it beneficial, and in some 	cases, saw it as an additional ungraded piece of assessment .</a:t>
-            </a:r>
-          </a:p>
-          <a:p>
-            <a:pPr marL="0" indent="0" defTabSz="895350">
-              <a:buFont typeface="Arial" pitchFamily="34" charset="0"/>
-              <a:buNone/>
-            </a:pPr>
-            <a:r>
-              <a:rPr lang="en-IE" sz="2200" b="1" dirty="0">
-                <a:latin typeface="Arial" panose="020B0604020202020204" pitchFamily="34" charset="0"/>
-                <a:cs typeface="Arial" panose="020B0604020202020204" pitchFamily="34" charset="0"/>
-              </a:rPr>
-              <a:t>Q.2. </a:t>
-            </a:r>
-            <a:r>
-              <a:rPr lang="en-IE" sz="2200" dirty="0">
-                <a:latin typeface="Arial" panose="020B0604020202020204" pitchFamily="34" charset="0"/>
-                <a:cs typeface="Arial" panose="020B0604020202020204" pitchFamily="34" charset="0"/>
-              </a:rPr>
-              <a:t>	There was </a:t>
-            </a:r>
-            <a:r>
-              <a:rPr lang="en-IE" sz="2200" i="1" dirty="0">
-                <a:latin typeface="Arial" panose="020B0604020202020204" pitchFamily="34" charset="0"/>
-                <a:cs typeface="Arial" panose="020B0604020202020204" pitchFamily="34" charset="0"/>
-              </a:rPr>
-              <a:t>evidence to suggest it does, specifically relating to 	group based activities, and communicating with peers.  However, it is 	difficult to say positive findings were directly linked to the social 	learning activities introduced over the semester.</a:t>
-            </a:r>
-            <a:endParaRPr lang="en-IE" sz="2200" dirty="0">
+            <a:endParaRPr lang="en-IE" sz="2400" dirty="0">
               <a:latin typeface="Arial" panose="020B0604020202020204" pitchFamily="34" charset="0"/>
               <a:cs typeface="Arial" panose="020B0604020202020204" pitchFamily="34" charset="0"/>
             </a:endParaRPr>
-          </a:p>
-          <a:p>
-            <a:pPr marL="0" indent="0" defTabSz="895350">
-              <a:buFont typeface="Arial" pitchFamily="34" charset="0"/>
-              <a:buNone/>
-            </a:pPr>
-            <a:r>
-              <a:rPr lang="en-IE" sz="2200" b="1" dirty="0">
-                <a:latin typeface="Arial" panose="020B0604020202020204" pitchFamily="34" charset="0"/>
-                <a:cs typeface="Arial" panose="020B0604020202020204" pitchFamily="34" charset="0"/>
-              </a:rPr>
-              <a:t>Q.3 </a:t>
-            </a:r>
-            <a:r>
-              <a:rPr lang="en-IE" sz="2200" dirty="0">
-                <a:latin typeface="Arial" panose="020B0604020202020204" pitchFamily="34" charset="0"/>
-                <a:cs typeface="Arial" panose="020B0604020202020204" pitchFamily="34" charset="0"/>
-              </a:rPr>
-              <a:t>	</a:t>
-            </a:r>
-            <a:r>
-              <a:rPr lang="en-IE" sz="2200" i="1" dirty="0">
-                <a:latin typeface="Arial" panose="020B0604020202020204" pitchFamily="34" charset="0"/>
-                <a:cs typeface="Arial" panose="020B0604020202020204" pitchFamily="34" charset="0"/>
-              </a:rPr>
-              <a:t>The use of PBL and PAL was very successful in engaging students in 	computer programming, the students engaged in the activities and 	requested more of these activities in the future.</a:t>
-            </a:r>
-          </a:p>
-          <a:p>
-            <a:pPr marL="0" indent="0" defTabSz="895350">
-              <a:buFont typeface="Arial" pitchFamily="34" charset="0"/>
-              <a:buNone/>
-            </a:pPr>
-            <a:r>
-              <a:rPr lang="en-IE" sz="2200" b="1" dirty="0">
-                <a:latin typeface="Arial" panose="020B0604020202020204" pitchFamily="34" charset="0"/>
-                <a:cs typeface="Arial" panose="020B0604020202020204" pitchFamily="34" charset="0"/>
-              </a:rPr>
-              <a:t>Q.4</a:t>
-            </a:r>
-            <a:r>
-              <a:rPr lang="en-IE" sz="2200" dirty="0">
-                <a:latin typeface="Arial" panose="020B0604020202020204" pitchFamily="34" charset="0"/>
-                <a:cs typeface="Arial" panose="020B0604020202020204" pitchFamily="34" charset="0"/>
-              </a:rPr>
-              <a:t>	</a:t>
-            </a:r>
-            <a:r>
-              <a:rPr lang="en-IE" sz="2200" i="1" dirty="0">
-                <a:latin typeface="Arial" panose="020B0604020202020204" pitchFamily="34" charset="0"/>
-                <a:cs typeface="Arial" panose="020B0604020202020204" pitchFamily="34" charset="0"/>
-              </a:rPr>
-              <a:t>There was no strong evidence to suggest social learning improved 	self-efficacy in computer programming, however, there was strong 	evidence found that participating in group work enhances self-efficacy 	in working with others in group activities.</a:t>
-            </a:r>
           </a:p>
         </p:txBody>
       </p:sp>
@@ -16514,15 +16488,15 @@
         </p:nvSpPr>
         <p:spPr>
           <a:xfrm>
-            <a:off x="33656519" y="29479722"/>
-            <a:ext cx="9736942" cy="2621175"/>
+            <a:off x="33518497" y="31118741"/>
+            <a:ext cx="9805952" cy="947651"/>
           </a:xfrm>
           <a:prstGeom prst="rect">
             <a:avLst/>
           </a:prstGeom>
         </p:spPr>
         <p:txBody>
-          <a:bodyPr>
+          <a:bodyPr lIns="91440" tIns="45720" rIns="91440" bIns="45720" anchor="t">
             <a:noAutofit/>
           </a:bodyPr>
           <a:lstStyle>
@@ -16667,18 +16641,13 @@
               <a:buNone/>
             </a:pPr>
             <a:r>
-              <a:rPr lang="en-IE" sz="900" dirty="0">
-                <a:latin typeface="Arial" panose="020B0604020202020204" pitchFamily="34" charset="0"/>
-                <a:cs typeface="Arial" panose="020B0604020202020204" pitchFamily="34" charset="0"/>
+              <a:rPr lang="en-IE" sz="2400" dirty="0">
+                <a:latin typeface="Arial"/>
+                <a:cs typeface="Arial"/>
               </a:rPr>
-              <a:t>Bandura, A. (1986). Social Foundations of Thought and Action: Social Cognitive Theory. U.S.A: Pearson Education.</a:t>
+              <a:t>Full reference list with all references of the project:</a:t>
             </a:r>
-          </a:p>
-          <a:p>
-            <a:pPr marL="0" indent="0" algn="just" defTabSz="895350">
-              <a:buNone/>
-            </a:pPr>
-            <a:endParaRPr lang="en-IE" sz="900" dirty="0">
+            <a:endParaRPr lang="en-IE" sz="2400" dirty="0">
               <a:latin typeface="Arial" panose="020B0604020202020204" pitchFamily="34" charset="0"/>
               <a:cs typeface="Arial" panose="020B0604020202020204" pitchFamily="34" charset="0"/>
             </a:endParaRPr>
@@ -16688,199 +16657,19 @@
               <a:buNone/>
             </a:pPr>
             <a:r>
-              <a:rPr lang="en-IE" sz="900" dirty="0">
-                <a:latin typeface="Arial" panose="020B0604020202020204" pitchFamily="34" charset="0"/>
-                <a:cs typeface="Arial" panose="020B0604020202020204" pitchFamily="34" charset="0"/>
+              <a:rPr lang="en-IE" sz="2400" dirty="0">
+                <a:latin typeface="Arial"/>
+                <a:ea typeface="+mn-lt"/>
+                <a:cs typeface="+mn-lt"/>
+                <a:hlinkClick r:id="rId3"/>
               </a:rPr>
-              <a:t>Bandura, A. (2006). Guide for constructing self-efficacy scales. In F. </a:t>
+              <a:t>https://www.mybib.com/b/yKNwZN</a:t>
             </a:r>
-            <a:r>
-              <a:rPr lang="en-IE" sz="900" dirty="0" err="1">
-                <a:latin typeface="Arial" panose="020B0604020202020204" pitchFamily="34" charset="0"/>
-                <a:cs typeface="Arial" panose="020B0604020202020204" pitchFamily="34" charset="0"/>
-              </a:rPr>
-              <a:t>Pajares</a:t>
-            </a:r>
-            <a:r>
-              <a:rPr lang="en-IE" sz="900" dirty="0">
-                <a:latin typeface="Arial" panose="020B0604020202020204" pitchFamily="34" charset="0"/>
-                <a:cs typeface="Arial" panose="020B0604020202020204" pitchFamily="34" charset="0"/>
-              </a:rPr>
-              <a:t>, &amp; T. </a:t>
-            </a:r>
-            <a:r>
-              <a:rPr lang="en-IE" sz="900" dirty="0" err="1">
-                <a:latin typeface="Arial" panose="020B0604020202020204" pitchFamily="34" charset="0"/>
-                <a:cs typeface="Arial" panose="020B0604020202020204" pitchFamily="34" charset="0"/>
-              </a:rPr>
-              <a:t>Urdan</a:t>
-            </a:r>
-            <a:r>
-              <a:rPr lang="en-IE" sz="900" dirty="0">
-                <a:latin typeface="Arial" panose="020B0604020202020204" pitchFamily="34" charset="0"/>
-                <a:cs typeface="Arial" panose="020B0604020202020204" pitchFamily="34" charset="0"/>
-              </a:rPr>
-              <a:t> (Eds.), Adolescence and education: Vol. 5. Self efficacy and adolescence (pp. 307-337). Greenwich, CT: Information Age.</a:t>
-            </a:r>
-          </a:p>
-          <a:p>
-            <a:pPr marL="0" indent="0" algn="just" defTabSz="895350">
-              <a:buNone/>
-            </a:pPr>
-            <a:endParaRPr lang="en-IE" sz="900" dirty="0">
-              <a:latin typeface="Arial" panose="020B0604020202020204" pitchFamily="34" charset="0"/>
-              <a:cs typeface="Arial" panose="020B0604020202020204" pitchFamily="34" charset="0"/>
+            <a:endParaRPr lang="en-IE">
+              <a:latin typeface="Arial"/>
+              <a:ea typeface="+mn-lt"/>
+              <a:cs typeface="+mn-lt"/>
             </a:endParaRPr>
-          </a:p>
-          <a:p>
-            <a:pPr marL="0" indent="0" algn="just" defTabSz="895350">
-              <a:buNone/>
-            </a:pPr>
-            <a:r>
-              <a:rPr lang="en-IE" sz="900" dirty="0">
-                <a:latin typeface="Arial" panose="020B0604020202020204" pitchFamily="34" charset="0"/>
-                <a:cs typeface="Arial" panose="020B0604020202020204" pitchFamily="34" charset="0"/>
-              </a:rPr>
-              <a:t>Bogdan, R.C., </a:t>
-            </a:r>
-            <a:r>
-              <a:rPr lang="en-IE" sz="900" dirty="0" err="1">
-                <a:latin typeface="Arial" panose="020B0604020202020204" pitchFamily="34" charset="0"/>
-                <a:cs typeface="Arial" panose="020B0604020202020204" pitchFamily="34" charset="0"/>
-              </a:rPr>
-              <a:t>Biklin</a:t>
-            </a:r>
-            <a:r>
-              <a:rPr lang="en-IE" sz="900" dirty="0">
-                <a:latin typeface="Arial" panose="020B0604020202020204" pitchFamily="34" charset="0"/>
-                <a:cs typeface="Arial" panose="020B0604020202020204" pitchFamily="34" charset="0"/>
-              </a:rPr>
-              <a:t>, S.K. (1998). Qualitative research for education: An introduction to theory and methods. (3rd edition).  Boston: </a:t>
-            </a:r>
-            <a:r>
-              <a:rPr lang="en-IE" sz="900" dirty="0" err="1">
-                <a:latin typeface="Arial" panose="020B0604020202020204" pitchFamily="34" charset="0"/>
-                <a:cs typeface="Arial" panose="020B0604020202020204" pitchFamily="34" charset="0"/>
-              </a:rPr>
-              <a:t>Allyn</a:t>
-            </a:r>
-            <a:r>
-              <a:rPr lang="en-IE" sz="900" dirty="0">
-                <a:latin typeface="Arial" panose="020B0604020202020204" pitchFamily="34" charset="0"/>
-                <a:cs typeface="Arial" panose="020B0604020202020204" pitchFamily="34" charset="0"/>
-              </a:rPr>
-              <a:t> and Bacon.</a:t>
-            </a:r>
-          </a:p>
-          <a:p>
-            <a:pPr marL="0" indent="0" algn="just" defTabSz="895350">
-              <a:buNone/>
-            </a:pPr>
-            <a:endParaRPr lang="en-IE" sz="900" dirty="0">
-              <a:latin typeface="Arial" panose="020B0604020202020204" pitchFamily="34" charset="0"/>
-              <a:cs typeface="Arial" panose="020B0604020202020204" pitchFamily="34" charset="0"/>
-            </a:endParaRPr>
-          </a:p>
-          <a:p>
-            <a:pPr marL="0" indent="0" algn="just" defTabSz="895350">
-              <a:buNone/>
-            </a:pPr>
-            <a:r>
-              <a:rPr lang="en-IE" sz="900" dirty="0">
-                <a:latin typeface="Arial" panose="020B0604020202020204" pitchFamily="34" charset="0"/>
-                <a:cs typeface="Arial" panose="020B0604020202020204" pitchFamily="34" charset="0"/>
-              </a:rPr>
-              <a:t>Bryman, A. (2004). Social Research Methods.  U.K.: Oxford University Press.</a:t>
-            </a:r>
-          </a:p>
-          <a:p>
-            <a:pPr marL="0" indent="0" algn="just" defTabSz="895350">
-              <a:buNone/>
-            </a:pPr>
-            <a:endParaRPr lang="en-IE" sz="900" dirty="0">
-              <a:latin typeface="Arial" panose="020B0604020202020204" pitchFamily="34" charset="0"/>
-              <a:cs typeface="Arial" panose="020B0604020202020204" pitchFamily="34" charset="0"/>
-            </a:endParaRPr>
-          </a:p>
-          <a:p>
-            <a:pPr marL="0" indent="0" algn="just" defTabSz="895350">
-              <a:buNone/>
-            </a:pPr>
-            <a:r>
-              <a:rPr lang="en-IE" sz="900" dirty="0">
-                <a:latin typeface="Arial" panose="020B0604020202020204" pitchFamily="34" charset="0"/>
-                <a:cs typeface="Arial" panose="020B0604020202020204" pitchFamily="34" charset="0"/>
-              </a:rPr>
-              <a:t>Creswell, J.W., Miller, G.A. (1997).  Research Methodologies and Doctoral Process.  New Directions for Higher Education, no.99.  U.S.A.: Wiley.</a:t>
-            </a:r>
-          </a:p>
-          <a:p>
-            <a:pPr marL="0" indent="0" algn="just" defTabSz="895350">
-              <a:buNone/>
-            </a:pPr>
-            <a:endParaRPr lang="en-IE" sz="900" dirty="0">
-              <a:latin typeface="Arial" panose="020B0604020202020204" pitchFamily="34" charset="0"/>
-              <a:cs typeface="Arial" panose="020B0604020202020204" pitchFamily="34" charset="0"/>
-            </a:endParaRPr>
-          </a:p>
-          <a:p>
-            <a:pPr marL="0" indent="0" algn="just" defTabSz="895350">
-              <a:buNone/>
-            </a:pPr>
-            <a:r>
-              <a:rPr lang="en-IE" sz="900" dirty="0">
-                <a:latin typeface="Arial" panose="020B0604020202020204" pitchFamily="34" charset="0"/>
-                <a:cs typeface="Arial" panose="020B0604020202020204" pitchFamily="34" charset="0"/>
-              </a:rPr>
-              <a:t>Hamir, S., </a:t>
-            </a:r>
-            <a:r>
-              <a:rPr lang="en-IE" sz="900" dirty="0" err="1">
-                <a:latin typeface="Arial" panose="020B0604020202020204" pitchFamily="34" charset="0"/>
-                <a:cs typeface="Arial" panose="020B0604020202020204" pitchFamily="34" charset="0"/>
-              </a:rPr>
-              <a:t>Maion</a:t>
-            </a:r>
-            <a:r>
-              <a:rPr lang="en-IE" sz="900" dirty="0">
-                <a:latin typeface="Arial" panose="020B0604020202020204" pitchFamily="34" charset="0"/>
-                <a:cs typeface="Arial" panose="020B0604020202020204" pitchFamily="34" charset="0"/>
-              </a:rPr>
-              <a:t>, S., Tice, S., &amp; Wideman, A. (2015) Constructivism in</a:t>
-            </a:r>
-          </a:p>
-          <a:p>
-            <a:pPr marL="0" indent="0" algn="just" defTabSz="895350">
-              <a:buNone/>
-            </a:pPr>
-            <a:r>
-              <a:rPr lang="en-IE" sz="900" dirty="0">
-                <a:latin typeface="Arial" panose="020B0604020202020204" pitchFamily="34" charset="0"/>
-                <a:cs typeface="Arial" panose="020B0604020202020204" pitchFamily="34" charset="0"/>
-              </a:rPr>
-              <a:t>Education. Available at: http://constructivism512.weebly.com . Accessed 27th February 2018.</a:t>
-            </a:r>
-          </a:p>
-          <a:p>
-            <a:pPr marL="0" indent="0" algn="just" defTabSz="895350">
-              <a:buNone/>
-            </a:pPr>
-            <a:endParaRPr lang="en-IE" sz="900" dirty="0">
-              <a:latin typeface="Arial" panose="020B0604020202020204" pitchFamily="34" charset="0"/>
-              <a:cs typeface="Arial" panose="020B0604020202020204" pitchFamily="34" charset="0"/>
-            </a:endParaRPr>
-          </a:p>
-          <a:p>
-            <a:pPr marL="0" indent="0" algn="just" defTabSz="895350">
-              <a:buNone/>
-            </a:pPr>
-            <a:r>
-              <a:rPr lang="en-IE" sz="900" dirty="0">
-                <a:latin typeface="Arial" panose="020B0604020202020204" pitchFamily="34" charset="0"/>
-                <a:cs typeface="Arial" panose="020B0604020202020204" pitchFamily="34" charset="0"/>
-              </a:rPr>
-              <a:t>Miles, M.B., &amp; Huberman, A.M. (1994). Qualitative data analysis: A sourcebook of new methods.  Thousand Oaks, CA: Sage.</a:t>
-            </a:r>
           </a:p>
         </p:txBody>
       </p:sp>
@@ -16899,7 +16688,7 @@
           <p:nvPr/>
         </p:nvPicPr>
         <p:blipFill>
-          <a:blip r:embed="rId3"/>
+          <a:blip r:embed="rId4"/>
           <a:stretch>
             <a:fillRect/>
           </a:stretch>
@@ -17662,7 +17451,7 @@
           <p:nvPr/>
         </p:nvPicPr>
         <p:blipFill>
-          <a:blip r:embed="rId4"/>
+          <a:blip r:embed="rId5"/>
           <a:stretch>
             <a:fillRect/>
           </a:stretch>
@@ -17777,7 +17566,7 @@
           <p:nvPr/>
         </p:nvPicPr>
         <p:blipFill>
-          <a:blip r:embed="rId5"/>
+          <a:blip r:embed="rId6"/>
           <a:stretch>
             <a:fillRect/>
           </a:stretch>
@@ -17807,7 +17596,7 @@
           <p:nvPr/>
         </p:nvPicPr>
         <p:blipFill>
-          <a:blip r:embed="rId6"/>
+          <a:blip r:embed="rId7"/>
           <a:stretch>
             <a:fillRect/>
           </a:stretch>
@@ -18027,7 +17816,7 @@
         <p:spPr>
           <a:xfrm>
             <a:off x="22545675" y="26566393"/>
-            <a:ext cx="9751218" cy="3785652"/>
+            <a:ext cx="9751218" cy="5262979"/>
           </a:xfrm>
           <a:prstGeom prst="rect">
             <a:avLst/>
@@ -18050,15 +17839,286 @@
                 <a:ea typeface="Calibri"/>
                 <a:cs typeface="Calibri"/>
               </a:rPr>
-              <a:t>In the evaluation phase we did the assessment of the results of our final model. We could observe that the testing set had an RMSE of 0.895, while the training set had a 0.891 Root Mean Squared Error – way better than the initial indices of 2.24 for the LDA algorithm and </a:t>
+              <a:t>In the evaluation phase we did the assessment of the results of our final model. We could observe that the testing set had an RMSE of 0.895, while the training set had a 0.891 Root Mean Squared Error – way better than the initial indices of 2.24 for the LDA algorithm and 2.04 for the SVD (in a smaller sample of the data).</a:t>
             </a:r>
+          </a:p>
+          <a:p>
+            <a:pPr algn="just"/>
+            <a:endParaRPr lang="en-GB" sz="2400" dirty="0">
+              <a:latin typeface="Arial"/>
+              <a:ea typeface="Calibri"/>
+              <a:cs typeface="Calibri"/>
+            </a:endParaRPr>
+          </a:p>
+          <a:p>
+            <a:pPr algn="just"/>
             <a:r>
               <a:rPr lang="en-GB" sz="2400">
                 <a:latin typeface="Arial"/>
                 <a:ea typeface="Calibri"/>
                 <a:cs typeface="Calibri"/>
               </a:rPr>
-              <a:t>2.04 for the SVD (in a smaller sample of the data).</a:t>
+              <a:t>With that assessment we are proved that not only the use of the SVD algorithm already upgraded the efficiency of our model in smaller samples of data, but also got even better results at a bigger sample, which is what we have. With that, 0.89 points up or down.</a:t>
+            </a:r>
+            <a:endParaRPr lang="en-GB" sz="2400" dirty="0">
+              <a:latin typeface="Arial"/>
+              <a:ea typeface="Calibri"/>
+              <a:cs typeface="Calibri"/>
+            </a:endParaRPr>
+          </a:p>
+          <a:p>
+            <a:pPr algn="just"/>
+            <a:endParaRPr lang="en-GB" sz="2400" dirty="0">
+              <a:latin typeface="Arial"/>
+              <a:ea typeface="Calibri"/>
+              <a:cs typeface="Calibri"/>
+            </a:endParaRPr>
+          </a:p>
+          <a:p>
+            <a:pPr algn="just"/>
+            <a:r>
+              <a:rPr lang="en-GB" sz="2400" dirty="0">
+                <a:latin typeface="Arial"/>
+                <a:ea typeface="Calibri"/>
+                <a:cs typeface="Arial"/>
+              </a:rPr>
+              <a:t>Another important factor is that the final prediction consists of an average across several users. This might potentially mitigate inaccuracies in predictions for a single user. </a:t>
+            </a:r>
+            <a:endParaRPr lang="en-GB" sz="2400" dirty="0">
+              <a:latin typeface="Arial"/>
+              <a:ea typeface="Calibri"/>
+              <a:cs typeface="Calibri"/>
+            </a:endParaRPr>
+          </a:p>
+        </p:txBody>
+      </p:sp>
+      <p:sp>
+        <p:nvSpPr>
+          <p:cNvPr id="22" name="CaixaDeTexto 21">
+            <a:extLst>
+              <a:ext uri="{FF2B5EF4-FFF2-40B4-BE49-F238E27FC236}">
+                <a16:creationId xmlns:a16="http://schemas.microsoft.com/office/drawing/2014/main" id="{F34DA761-C085-E013-6E1A-E77DA63F9F98}"/>
+              </a:ext>
+            </a:extLst>
+          </p:cNvPr>
+          <p:cNvSpPr txBox="1"/>
+          <p:nvPr/>
+        </p:nvSpPr>
+        <p:spPr>
+          <a:xfrm>
+            <a:off x="33582768" y="5722143"/>
+            <a:ext cx="9665493" cy="3046988"/>
+          </a:xfrm>
+          <a:prstGeom prst="rect">
+            <a:avLst/>
+          </a:prstGeom>
+          <a:noFill/>
+        </p:spPr>
+        <p:txBody>
+          <a:bodyPr rot="0" spcFirstLastPara="0" vertOverflow="overflow" horzOverflow="overflow" vert="horz" wrap="square" lIns="91440" tIns="45720" rIns="91440" bIns="45720" numCol="1" spcCol="0" rtlCol="0" fromWordArt="0" anchor="t" anchorCtr="0" forceAA="0" compatLnSpc="1">
+            <a:prstTxWarp prst="textNoShape">
+              <a:avLst/>
+            </a:prstTxWarp>
+            <a:spAutoFit/>
+          </a:bodyPr>
+          <a:lstStyle/>
+          <a:p>
+            <a:pPr algn="just"/>
+            <a:r>
+              <a:rPr lang="en-GB" sz="2400" dirty="0">
+                <a:latin typeface="Arial"/>
+                <a:cs typeface="Arial"/>
+              </a:rPr>
+              <a:t>Systems that leverage, both collaborative filtering and prediction estimation, might further benefit from the fact that users are biassed toward their preferences. With this hybrid model, we are combining the best from both approaches, we take into account what similar users like, and tilt toward their preferences and  simultaneously, try to expand the pool of movies to recommend by predicting  rating across the entire final set. </a:t>
+            </a:r>
+            <a:endParaRPr lang="pt-BR" sz="2400" dirty="0">
+              <a:latin typeface="Arial"/>
+              <a:cs typeface="Arial"/>
+            </a:endParaRPr>
+          </a:p>
+          <a:p>
+            <a:endParaRPr lang="pt-BR" sz="2400" dirty="0">
+              <a:latin typeface="Arial"/>
+              <a:ea typeface="Calibri"/>
+              <a:cs typeface="Calibri"/>
+            </a:endParaRPr>
+          </a:p>
+        </p:txBody>
+      </p:sp>
+      <p:sp>
+        <p:nvSpPr>
+          <p:cNvPr id="23" name="CaixaDeTexto 22">
+            <a:extLst>
+              <a:ext uri="{FF2B5EF4-FFF2-40B4-BE49-F238E27FC236}">
+                <a16:creationId xmlns:a16="http://schemas.microsoft.com/office/drawing/2014/main" id="{8C3BB717-4A20-4104-27D7-2AD6D8759B57}"/>
+              </a:ext>
+            </a:extLst>
+          </p:cNvPr>
+          <p:cNvSpPr txBox="1"/>
+          <p:nvPr/>
+        </p:nvSpPr>
+        <p:spPr>
+          <a:xfrm>
+            <a:off x="33582768" y="8572500"/>
+            <a:ext cx="9665493" cy="2739211"/>
+          </a:xfrm>
+          <a:prstGeom prst="rect">
+            <a:avLst/>
+          </a:prstGeom>
+          <a:noFill/>
+        </p:spPr>
+        <p:txBody>
+          <a:bodyPr rot="0" spcFirstLastPara="0" vertOverflow="overflow" horzOverflow="overflow" vert="horz" wrap="square" lIns="91440" tIns="45720" rIns="91440" bIns="45720" numCol="1" spcCol="0" rtlCol="0" fromWordArt="0" anchor="t" anchorCtr="0" forceAA="0" compatLnSpc="1">
+            <a:prstTxWarp prst="textNoShape">
+              <a:avLst/>
+            </a:prstTxWarp>
+            <a:spAutoFit/>
+          </a:bodyPr>
+          <a:lstStyle/>
+          <a:p>
+            <a:pPr algn="ctr"/>
+            <a:r>
+              <a:rPr lang="pt-BR" sz="3700" b="1" u="sng" dirty="0" err="1">
+                <a:solidFill>
+                  <a:schemeClr val="tx2"/>
+                </a:solidFill>
+                <a:latin typeface="Arial"/>
+                <a:cs typeface="Arial"/>
+              </a:rPr>
+              <a:t>Stage</a:t>
+            </a:r>
+            <a:r>
+              <a:rPr lang="pt-BR" sz="3700" b="1" u="sng" dirty="0">
+                <a:solidFill>
+                  <a:schemeClr val="tx2"/>
+                </a:solidFill>
+                <a:latin typeface="Arial"/>
+                <a:cs typeface="Arial"/>
+              </a:rPr>
+              <a:t> 6 - Deployment</a:t>
+            </a:r>
+          </a:p>
+        </p:txBody>
+      </p:sp>
+      <p:sp>
+        <p:nvSpPr>
+          <p:cNvPr id="24" name="CaixaDeTexto 23">
+            <a:extLst>
+              <a:ext uri="{FF2B5EF4-FFF2-40B4-BE49-F238E27FC236}">
+                <a16:creationId xmlns:a16="http://schemas.microsoft.com/office/drawing/2014/main" id="{F09696AB-DE5E-1719-E147-0DE2864FE37B}"/>
+              </a:ext>
+            </a:extLst>
+          </p:cNvPr>
+          <p:cNvSpPr txBox="1"/>
+          <p:nvPr/>
+        </p:nvSpPr>
+        <p:spPr>
+          <a:xfrm>
+            <a:off x="33495427" y="9226894"/>
+            <a:ext cx="9748656" cy="8586966"/>
+          </a:xfrm>
+          <a:prstGeom prst="rect">
+            <a:avLst/>
+          </a:prstGeom>
+          <a:noFill/>
+        </p:spPr>
+        <p:txBody>
+          <a:bodyPr rot="0" spcFirstLastPara="0" vertOverflow="overflow" horzOverflow="overflow" vert="horz" wrap="square" lIns="91440" tIns="45720" rIns="91440" bIns="45720" numCol="1" spcCol="0" rtlCol="0" fromWordArt="0" anchor="t" anchorCtr="0" forceAA="0" compatLnSpc="1">
+            <a:prstTxWarp prst="textNoShape">
+              <a:avLst/>
+            </a:prstTxWarp>
+            <a:spAutoFit/>
+          </a:bodyPr>
+          <a:lstStyle/>
+          <a:p>
+            <a:pPr algn="just"/>
+            <a:r>
+              <a:rPr lang="en-GB" sz="2400" dirty="0">
+                <a:latin typeface="Arial"/>
+                <a:ea typeface="Calibri"/>
+                <a:cs typeface="Calibri"/>
+              </a:rPr>
+              <a:t>For the deployment phase we started by generating a </a:t>
+            </a:r>
+            <a:r>
+              <a:rPr lang="en-GB" sz="2400" dirty="0" err="1">
+                <a:latin typeface="Arial"/>
+                <a:ea typeface="Calibri"/>
+                <a:cs typeface="Calibri"/>
+              </a:rPr>
+              <a:t>dataframe</a:t>
+            </a:r>
+            <a:r>
+              <a:rPr lang="en-GB" sz="2400" dirty="0">
+                <a:latin typeface="Arial"/>
+                <a:ea typeface="Calibri"/>
+                <a:cs typeface="Calibri"/>
+              </a:rPr>
+              <a:t> with estimated rating as a preprocessing step and named it '</a:t>
+            </a:r>
+            <a:r>
+              <a:rPr lang="en-GB" sz="2400" dirty="0" err="1">
+                <a:latin typeface="Arial"/>
+                <a:ea typeface="Calibri"/>
+                <a:cs typeface="Calibri"/>
+              </a:rPr>
+              <a:t>df_estimated</a:t>
+            </a:r>
+            <a:r>
+              <a:rPr lang="en-GB" sz="2400" dirty="0">
+                <a:latin typeface="Arial"/>
+                <a:ea typeface="Calibri"/>
+                <a:cs typeface="Calibri"/>
+              </a:rPr>
+              <a:t>'. This dataset generates rating predictions in advanced so when we run our application it does not have to run for a longer period </a:t>
+            </a:r>
+            <a:r>
+              <a:rPr lang="en-GB" sz="2400" dirty="0" err="1">
+                <a:latin typeface="Arial"/>
+                <a:ea typeface="Calibri"/>
+                <a:cs typeface="Calibri"/>
+              </a:rPr>
+              <a:t>period</a:t>
+            </a:r>
+            <a:r>
+              <a:rPr lang="en-GB" sz="2400" dirty="0">
+                <a:latin typeface="Arial"/>
+                <a:ea typeface="Calibri"/>
+                <a:cs typeface="Calibri"/>
+              </a:rPr>
+              <a:t> of time. This dataset has 3 columns ('</a:t>
+            </a:r>
+            <a:r>
+              <a:rPr lang="en-GB" sz="2400" dirty="0" err="1">
+                <a:latin typeface="Arial"/>
+                <a:ea typeface="Calibri"/>
+                <a:cs typeface="Calibri"/>
+              </a:rPr>
+              <a:t>UserId</a:t>
+            </a:r>
+            <a:r>
+              <a:rPr lang="en-GB" sz="2400" dirty="0">
+                <a:latin typeface="Arial"/>
+                <a:ea typeface="Calibri"/>
+                <a:cs typeface="Calibri"/>
+              </a:rPr>
+              <a:t>', '</a:t>
+            </a:r>
+            <a:r>
+              <a:rPr lang="en-GB" sz="2400" dirty="0" err="1">
+                <a:latin typeface="Arial"/>
+                <a:ea typeface="Calibri"/>
+                <a:cs typeface="Calibri"/>
+              </a:rPr>
+              <a:t>movieId</a:t>
+            </a:r>
+            <a:r>
+              <a:rPr lang="en-GB" sz="2400" dirty="0">
+                <a:latin typeface="Arial"/>
+                <a:ea typeface="Calibri"/>
+                <a:cs typeface="Calibri"/>
+              </a:rPr>
+              <a:t>' and 'rating') and more than 95M rows. It contains 588 movies and 162k unique users, giving us enough amplitude to recommend movies from there and eliminate some possible biases.</a:t>
             </a:r>
           </a:p>
           <a:p>
@@ -18077,532 +18137,151 @@
                 <a:ea typeface="Calibri"/>
                 <a:cs typeface="Calibri"/>
               </a:rPr>
-              <a:t>With that assessment we are</a:t>
+              <a:t>After this first step, we did a function called '</a:t>
             </a:r>
+            <a:r>
+              <a:rPr lang="en-GB" sz="2400" dirty="0" err="1">
+                <a:latin typeface="Arial"/>
+                <a:ea typeface="Calibri"/>
+                <a:cs typeface="Calibri"/>
+              </a:rPr>
+              <a:t>find_similar_users</a:t>
+            </a:r>
+            <a:r>
+              <a:rPr lang="en-GB" sz="2400" dirty="0">
+                <a:latin typeface="Arial"/>
+                <a:ea typeface="Calibri"/>
+                <a:cs typeface="Calibri"/>
+              </a:rPr>
+              <a:t>' that uses cosine similarity to find users that rated movies in a similar way that we did (or will do) when using the app. This allows us to see how these users rated other movies and use their rating as a recommendation mechanism for us. To validate our model we created a random user, gave this user random ratings to random movies and compared it to other 9 similar users.</a:t>
+            </a:r>
+          </a:p>
+          <a:p>
+            <a:pPr algn="just"/>
+            <a:endParaRPr lang="en-GB" sz="2400" dirty="0">
+              <a:latin typeface="Arial"/>
+              <a:ea typeface="Calibri"/>
+              <a:cs typeface="Calibri"/>
+            </a:endParaRPr>
+          </a:p>
+          <a:p>
+            <a:pPr algn="just"/>
+            <a:r>
+              <a:rPr lang="en-GB" sz="2400" dirty="0">
+                <a:latin typeface="Arial"/>
+                <a:ea typeface="Calibri"/>
+                <a:cs typeface="Calibri"/>
+              </a:rPr>
+              <a:t>This allowed us to create a decrescent dataset entitled '</a:t>
+            </a:r>
+            <a:r>
+              <a:rPr lang="en-GB" sz="2400" dirty="0" err="1">
+                <a:latin typeface="Arial"/>
+                <a:ea typeface="Calibri"/>
+                <a:cs typeface="Calibri"/>
+              </a:rPr>
+              <a:t>sorted_df</a:t>
+            </a:r>
+            <a:r>
+              <a:rPr lang="en-GB" sz="2400" dirty="0">
+                <a:latin typeface="Arial"/>
+                <a:ea typeface="Calibri"/>
+                <a:cs typeface="Calibri"/>
+              </a:rPr>
+              <a:t>' with estimated ratings for all the movies presents in the '</a:t>
+            </a:r>
+            <a:r>
+              <a:rPr lang="en-GB" sz="2400" dirty="0" err="1">
+                <a:latin typeface="Arial"/>
+                <a:ea typeface="Calibri"/>
+                <a:cs typeface="Calibri"/>
+              </a:rPr>
+              <a:t>df_estimated</a:t>
+            </a:r>
+            <a:r>
+              <a:rPr lang="en-GB" sz="2400" dirty="0">
+                <a:latin typeface="Arial"/>
+                <a:ea typeface="Calibri"/>
+                <a:cs typeface="Calibri"/>
+              </a:rPr>
+              <a:t>' dataset (588 movies with 10k+ ratings). This enables us to create a class 'Recommender' to be used in our last item: Our GUI. Where our user can give a rating between 1-10 to how many movies they want (we recommend 10) and obtain a decrescent list of titles.</a:t>
+            </a:r>
+          </a:p>
+        </p:txBody>
+      </p:sp>
+      <p:pic>
+        <p:nvPicPr>
+          <p:cNvPr id="26" name="Imagem 25" descr="Tabela&#10;&#10;Descrição gerada automaticamente">
+            <a:extLst>
+              <a:ext uri="{FF2B5EF4-FFF2-40B4-BE49-F238E27FC236}">
+                <a16:creationId xmlns:a16="http://schemas.microsoft.com/office/drawing/2014/main" id="{2F68D4EE-63B4-B304-F1DF-2719624F6DC5}"/>
+              </a:ext>
+            </a:extLst>
+          </p:cNvPr>
+          <p:cNvPicPr>
+            <a:picLocks noChangeAspect="1"/>
+          </p:cNvPicPr>
+          <p:nvPr/>
+        </p:nvPicPr>
+        <p:blipFill>
+          <a:blip r:embed="rId8"/>
+          <a:stretch>
+            <a:fillRect/>
+          </a:stretch>
+        </p:blipFill>
+        <p:spPr>
+          <a:xfrm>
+            <a:off x="33812492" y="17818489"/>
+            <a:ext cx="9201869" cy="6477179"/>
+          </a:xfrm>
+          <a:prstGeom prst="rect">
+            <a:avLst/>
+          </a:prstGeom>
+        </p:spPr>
+      </p:pic>
+      <p:sp>
+        <p:nvSpPr>
+          <p:cNvPr id="27" name="CaixaDeTexto 26">
+            <a:extLst>
+              <a:ext uri="{FF2B5EF4-FFF2-40B4-BE49-F238E27FC236}">
+                <a16:creationId xmlns:a16="http://schemas.microsoft.com/office/drawing/2014/main" id="{457DB4A5-0DC3-5E50-25F8-EEEFFA69FD50}"/>
+              </a:ext>
+            </a:extLst>
+          </p:cNvPr>
+          <p:cNvSpPr txBox="1"/>
+          <p:nvPr/>
+        </p:nvSpPr>
+        <p:spPr>
+          <a:xfrm>
+            <a:off x="33647063" y="24453056"/>
+            <a:ext cx="9515474" cy="461665"/>
+          </a:xfrm>
+          <a:prstGeom prst="rect">
+            <a:avLst/>
+          </a:prstGeom>
+          <a:noFill/>
+        </p:spPr>
+        <p:txBody>
+          <a:bodyPr rot="0" spcFirstLastPara="0" vertOverflow="overflow" horzOverflow="overflow" vert="horz" wrap="square" lIns="91440" tIns="45720" rIns="91440" bIns="45720" numCol="1" spcCol="0" rtlCol="0" fromWordArt="0" anchor="t" anchorCtr="0" forceAA="0" compatLnSpc="1">
+            <a:prstTxWarp prst="textNoShape">
+              <a:avLst/>
+            </a:prstTxWarp>
+            <a:spAutoFit/>
+          </a:bodyPr>
+          <a:lstStyle/>
+          <a:p>
+            <a:pPr algn="ctr"/>
             <a:r>
               <a:rPr lang="pt-BR" sz="2400" dirty="0">
                 <a:latin typeface="Arial"/>
                 <a:ea typeface="Calibri"/>
                 <a:cs typeface="Calibri"/>
               </a:rPr>
-              <a:t> </a:t>
-            </a:r>
-            <a:r>
-              <a:rPr lang="pt-BR" sz="2400" err="1">
-                <a:latin typeface="Arial"/>
-                <a:ea typeface="Calibri"/>
-                <a:cs typeface="Calibri"/>
-              </a:rPr>
-              <a:t>proved</a:t>
-            </a:r>
-            <a:r>
-              <a:rPr lang="pt-BR" sz="2400" dirty="0">
-                <a:latin typeface="Arial"/>
-                <a:ea typeface="Calibri"/>
-                <a:cs typeface="Calibri"/>
-              </a:rPr>
-              <a:t> </a:t>
-            </a:r>
-            <a:r>
-              <a:rPr lang="pt-BR" sz="2400" err="1">
-                <a:latin typeface="Arial"/>
-                <a:ea typeface="Calibri"/>
-                <a:cs typeface="Calibri"/>
-              </a:rPr>
-              <a:t>that</a:t>
-            </a:r>
-            <a:r>
-              <a:rPr lang="pt-BR" sz="2400" dirty="0">
-                <a:latin typeface="Arial"/>
-                <a:ea typeface="Calibri"/>
-                <a:cs typeface="Calibri"/>
-              </a:rPr>
-              <a:t> </a:t>
-            </a:r>
-            <a:r>
-              <a:rPr lang="pt-BR" sz="2400" err="1">
-                <a:latin typeface="Arial"/>
-                <a:ea typeface="Calibri"/>
-                <a:cs typeface="Calibri"/>
-              </a:rPr>
-              <a:t>not</a:t>
-            </a:r>
-            <a:r>
-              <a:rPr lang="pt-BR" sz="2400" dirty="0">
-                <a:latin typeface="Arial"/>
-                <a:ea typeface="Calibri"/>
-                <a:cs typeface="Calibri"/>
-              </a:rPr>
-              <a:t> </a:t>
-            </a:r>
-            <a:r>
-              <a:rPr lang="pt-BR" sz="2400" err="1">
-                <a:latin typeface="Arial"/>
-                <a:ea typeface="Calibri"/>
-                <a:cs typeface="Calibri"/>
-              </a:rPr>
-              <a:t>only</a:t>
-            </a:r>
-            <a:r>
-              <a:rPr lang="pt-BR" sz="2400" dirty="0">
-                <a:latin typeface="Arial"/>
-                <a:ea typeface="Calibri"/>
-                <a:cs typeface="Calibri"/>
-              </a:rPr>
-              <a:t> </a:t>
-            </a:r>
-            <a:r>
-              <a:rPr lang="pt-BR" sz="2400" err="1">
-                <a:latin typeface="Arial"/>
-                <a:ea typeface="Calibri"/>
-                <a:cs typeface="Calibri"/>
-              </a:rPr>
-              <a:t>the</a:t>
-            </a:r>
-            <a:r>
-              <a:rPr lang="pt-BR" sz="2400" dirty="0">
-                <a:latin typeface="Arial"/>
-                <a:ea typeface="Calibri"/>
-                <a:cs typeface="Calibri"/>
-              </a:rPr>
-              <a:t> use </a:t>
-            </a:r>
-            <a:r>
-              <a:rPr lang="pt-BR" sz="2400" err="1">
-                <a:latin typeface="Arial"/>
-                <a:ea typeface="Calibri"/>
-                <a:cs typeface="Calibri"/>
-              </a:rPr>
-              <a:t>of</a:t>
-            </a:r>
-            <a:r>
-              <a:rPr lang="pt-BR" sz="2400" dirty="0">
-                <a:latin typeface="Arial"/>
-                <a:ea typeface="Calibri"/>
-                <a:cs typeface="Calibri"/>
-              </a:rPr>
-              <a:t> </a:t>
-            </a:r>
-            <a:r>
-              <a:rPr lang="pt-BR" sz="2400" err="1">
-                <a:latin typeface="Arial"/>
-                <a:ea typeface="Calibri"/>
-                <a:cs typeface="Calibri"/>
-              </a:rPr>
-              <a:t>the</a:t>
-            </a:r>
-            <a:r>
-              <a:rPr lang="pt-BR" sz="2400" dirty="0">
-                <a:latin typeface="Arial"/>
-                <a:ea typeface="Calibri"/>
-                <a:cs typeface="Calibri"/>
-              </a:rPr>
-              <a:t> SVD </a:t>
-            </a:r>
-            <a:r>
-              <a:rPr lang="pt-BR" sz="2400" err="1">
-                <a:latin typeface="Arial"/>
-                <a:ea typeface="Calibri"/>
-                <a:cs typeface="Calibri"/>
-              </a:rPr>
-              <a:t>algorithm</a:t>
-            </a:r>
-            <a:r>
-              <a:rPr lang="pt-BR" sz="2400" dirty="0">
-                <a:latin typeface="Arial"/>
-                <a:ea typeface="Calibri"/>
-                <a:cs typeface="Calibri"/>
-              </a:rPr>
-              <a:t> </a:t>
-            </a:r>
-            <a:r>
-              <a:rPr lang="pt-BR" sz="2400" err="1">
-                <a:latin typeface="Arial"/>
-                <a:ea typeface="Calibri"/>
-                <a:cs typeface="Calibri"/>
-              </a:rPr>
-              <a:t>already</a:t>
-            </a:r>
-            <a:r>
-              <a:rPr lang="pt-BR" sz="2400" dirty="0">
-                <a:latin typeface="Arial"/>
-                <a:ea typeface="Calibri"/>
-                <a:cs typeface="Calibri"/>
-              </a:rPr>
-              <a:t> </a:t>
-            </a:r>
-            <a:r>
-              <a:rPr lang="pt-BR" sz="2400" err="1">
-                <a:latin typeface="Arial"/>
-                <a:ea typeface="Calibri"/>
-                <a:cs typeface="Calibri"/>
-              </a:rPr>
-              <a:t>upgraded</a:t>
-            </a:r>
-            <a:r>
-              <a:rPr lang="pt-BR" sz="2400" dirty="0">
-                <a:latin typeface="Arial"/>
-                <a:ea typeface="Calibri"/>
-                <a:cs typeface="Calibri"/>
-              </a:rPr>
-              <a:t> </a:t>
-            </a:r>
-            <a:r>
-              <a:rPr lang="pt-BR" sz="2400" err="1">
-                <a:latin typeface="Arial"/>
-                <a:ea typeface="Calibri"/>
-                <a:cs typeface="Calibri"/>
-              </a:rPr>
-              <a:t>the</a:t>
-            </a:r>
-            <a:r>
-              <a:rPr lang="pt-BR" sz="2400" dirty="0">
-                <a:latin typeface="Arial"/>
-                <a:ea typeface="Calibri"/>
-                <a:cs typeface="Calibri"/>
-              </a:rPr>
-              <a:t> </a:t>
-            </a:r>
-            <a:r>
-              <a:rPr lang="pt-BR" sz="2400" err="1">
-                <a:latin typeface="Arial"/>
-                <a:ea typeface="Calibri"/>
-                <a:cs typeface="Calibri"/>
-              </a:rPr>
-              <a:t>efficiency</a:t>
-            </a:r>
-            <a:r>
-              <a:rPr lang="pt-BR" sz="2400" dirty="0">
-                <a:latin typeface="Arial"/>
-                <a:ea typeface="Calibri"/>
-                <a:cs typeface="Calibri"/>
-              </a:rPr>
-              <a:t> </a:t>
-            </a:r>
-            <a:r>
-              <a:rPr lang="pt-BR" sz="2400" err="1">
-                <a:latin typeface="Arial"/>
-                <a:ea typeface="Calibri"/>
-                <a:cs typeface="Calibri"/>
-              </a:rPr>
-              <a:t>of</a:t>
-            </a:r>
-            <a:r>
-              <a:rPr lang="pt-BR" sz="2400" dirty="0">
-                <a:latin typeface="Arial"/>
-                <a:ea typeface="Calibri"/>
-                <a:cs typeface="Calibri"/>
-              </a:rPr>
-              <a:t> </a:t>
-            </a:r>
-            <a:r>
-              <a:rPr lang="pt-BR" sz="2400" err="1">
-                <a:latin typeface="Arial"/>
-                <a:ea typeface="Calibri"/>
-                <a:cs typeface="Calibri"/>
-              </a:rPr>
-              <a:t>our</a:t>
-            </a:r>
-            <a:r>
-              <a:rPr lang="pt-BR" sz="2400" dirty="0">
-                <a:latin typeface="Arial"/>
-                <a:ea typeface="Calibri"/>
-                <a:cs typeface="Calibri"/>
-              </a:rPr>
-              <a:t> model in </a:t>
-            </a:r>
-            <a:r>
-              <a:rPr lang="pt-BR" sz="2400" err="1">
-                <a:latin typeface="Arial"/>
-                <a:ea typeface="Calibri"/>
-                <a:cs typeface="Calibri"/>
-              </a:rPr>
-              <a:t>smaller</a:t>
-            </a:r>
-            <a:r>
-              <a:rPr lang="pt-BR" sz="2400" dirty="0">
-                <a:latin typeface="Arial"/>
-                <a:ea typeface="Calibri"/>
-                <a:cs typeface="Calibri"/>
-              </a:rPr>
-              <a:t> samples </a:t>
-            </a:r>
-            <a:r>
-              <a:rPr lang="pt-BR" sz="2400" err="1">
-                <a:latin typeface="Arial"/>
-                <a:ea typeface="Calibri"/>
-                <a:cs typeface="Calibri"/>
-              </a:rPr>
-              <a:t>of</a:t>
-            </a:r>
-            <a:r>
-              <a:rPr lang="pt-BR" sz="2400" dirty="0">
-                <a:latin typeface="Arial"/>
-                <a:ea typeface="Calibri"/>
-                <a:cs typeface="Calibri"/>
-              </a:rPr>
-              <a:t> data, </a:t>
-            </a:r>
-            <a:r>
-              <a:rPr lang="pt-BR" sz="2400" err="1">
-                <a:latin typeface="Arial"/>
-                <a:ea typeface="Calibri"/>
-                <a:cs typeface="Calibri"/>
-              </a:rPr>
-              <a:t>but</a:t>
-            </a:r>
-            <a:r>
-              <a:rPr lang="pt-BR" sz="2400" dirty="0">
-                <a:latin typeface="Arial"/>
-                <a:ea typeface="Calibri"/>
-                <a:cs typeface="Calibri"/>
-              </a:rPr>
-              <a:t> </a:t>
-            </a:r>
-            <a:r>
-              <a:rPr lang="pt-BR" sz="2400" err="1">
-                <a:latin typeface="Arial"/>
-                <a:ea typeface="Calibri"/>
-                <a:cs typeface="Calibri"/>
-              </a:rPr>
-              <a:t>also</a:t>
-            </a:r>
-            <a:r>
-              <a:rPr lang="pt-BR" sz="2400" dirty="0">
-                <a:latin typeface="Arial"/>
-                <a:ea typeface="Calibri"/>
-                <a:cs typeface="Calibri"/>
-              </a:rPr>
-              <a:t> </a:t>
-            </a:r>
-            <a:r>
-              <a:rPr lang="pt-BR" sz="2400" err="1">
-                <a:latin typeface="Arial"/>
-                <a:ea typeface="Calibri"/>
-                <a:cs typeface="Calibri"/>
-              </a:rPr>
-              <a:t>got</a:t>
-            </a:r>
-            <a:r>
-              <a:rPr lang="pt-BR" sz="2400" dirty="0">
-                <a:latin typeface="Arial"/>
-                <a:ea typeface="Calibri"/>
-                <a:cs typeface="Calibri"/>
-              </a:rPr>
-              <a:t> </a:t>
-            </a:r>
-            <a:r>
-              <a:rPr lang="pt-BR" sz="2400" err="1">
-                <a:latin typeface="Arial"/>
-                <a:ea typeface="Calibri"/>
-                <a:cs typeface="Calibri"/>
-              </a:rPr>
-              <a:t>even</a:t>
-            </a:r>
-            <a:r>
-              <a:rPr lang="pt-BR" sz="2400" dirty="0">
-                <a:latin typeface="Arial"/>
-                <a:ea typeface="Calibri"/>
-                <a:cs typeface="Calibri"/>
-              </a:rPr>
-              <a:t> </a:t>
-            </a:r>
-            <a:r>
-              <a:rPr lang="pt-BR" sz="2400" err="1">
-                <a:latin typeface="Arial"/>
-                <a:ea typeface="Calibri"/>
-                <a:cs typeface="Calibri"/>
-              </a:rPr>
-              <a:t>better</a:t>
-            </a:r>
-            <a:r>
-              <a:rPr lang="pt-BR" sz="2400" dirty="0">
-                <a:latin typeface="Arial"/>
-                <a:ea typeface="Calibri"/>
-                <a:cs typeface="Calibri"/>
-              </a:rPr>
-              <a:t> </a:t>
-            </a:r>
-            <a:r>
-              <a:rPr lang="pt-BR" sz="2400" err="1">
-                <a:latin typeface="Arial"/>
-                <a:ea typeface="Calibri"/>
-                <a:cs typeface="Calibri"/>
-              </a:rPr>
-              <a:t>results</a:t>
-            </a:r>
-            <a:r>
-              <a:rPr lang="pt-BR" sz="2400" dirty="0">
-                <a:latin typeface="Arial"/>
-                <a:ea typeface="Calibri"/>
-                <a:cs typeface="Calibri"/>
-              </a:rPr>
-              <a:t> </a:t>
-            </a:r>
-            <a:r>
-              <a:rPr lang="pt-BR" sz="2400" err="1">
-                <a:latin typeface="Arial"/>
-                <a:ea typeface="Calibri"/>
-                <a:cs typeface="Calibri"/>
-              </a:rPr>
-              <a:t>at</a:t>
-            </a:r>
-            <a:r>
-              <a:rPr lang="pt-BR" sz="2400" dirty="0">
-                <a:latin typeface="Arial"/>
-                <a:ea typeface="Calibri"/>
-                <a:cs typeface="Calibri"/>
-              </a:rPr>
-              <a:t> a </a:t>
-            </a:r>
-            <a:r>
-              <a:rPr lang="pt-BR" sz="2400" err="1">
-                <a:latin typeface="Arial"/>
-                <a:ea typeface="Calibri"/>
-                <a:cs typeface="Calibri"/>
-              </a:rPr>
-              <a:t>bigger</a:t>
-            </a:r>
-            <a:r>
-              <a:rPr lang="pt-BR" sz="2400" dirty="0">
-                <a:latin typeface="Arial"/>
-                <a:ea typeface="Calibri"/>
-                <a:cs typeface="Calibri"/>
-              </a:rPr>
-              <a:t> sample, </a:t>
-            </a:r>
-            <a:r>
-              <a:rPr lang="pt-BR" sz="2400" err="1">
-                <a:latin typeface="Arial"/>
-                <a:ea typeface="Calibri"/>
-                <a:cs typeface="Calibri"/>
-              </a:rPr>
-              <a:t>which</a:t>
-            </a:r>
-            <a:r>
-              <a:rPr lang="pt-BR" sz="2400" dirty="0">
-                <a:latin typeface="Arial"/>
-                <a:ea typeface="Calibri"/>
-                <a:cs typeface="Calibri"/>
-              </a:rPr>
-              <a:t> </a:t>
-            </a:r>
-            <a:r>
-              <a:rPr lang="pt-BR" sz="2400" err="1">
-                <a:latin typeface="Arial"/>
-                <a:ea typeface="Calibri"/>
-                <a:cs typeface="Calibri"/>
-              </a:rPr>
-              <a:t>is</a:t>
-            </a:r>
-            <a:r>
-              <a:rPr lang="pt-BR" sz="2400" dirty="0">
-                <a:latin typeface="Arial"/>
-                <a:ea typeface="Calibri"/>
-                <a:cs typeface="Calibri"/>
-              </a:rPr>
-              <a:t> </a:t>
-            </a:r>
-            <a:r>
-              <a:rPr lang="pt-BR" sz="2400" err="1">
-                <a:latin typeface="Arial"/>
-                <a:ea typeface="Calibri"/>
-                <a:cs typeface="Calibri"/>
-              </a:rPr>
-              <a:t>what</a:t>
-            </a:r>
-            <a:r>
-              <a:rPr lang="pt-BR" sz="2400" dirty="0">
-                <a:latin typeface="Arial"/>
-                <a:ea typeface="Calibri"/>
-                <a:cs typeface="Calibri"/>
-              </a:rPr>
-              <a:t> </a:t>
-            </a:r>
-            <a:r>
-              <a:rPr lang="pt-BR" sz="2400" err="1">
-                <a:latin typeface="Arial"/>
-                <a:ea typeface="Calibri"/>
-                <a:cs typeface="Calibri"/>
-              </a:rPr>
-              <a:t>we</a:t>
-            </a:r>
-            <a:r>
-              <a:rPr lang="pt-BR" sz="2400" dirty="0">
-                <a:latin typeface="Arial"/>
-                <a:ea typeface="Calibri"/>
-                <a:cs typeface="Calibri"/>
-              </a:rPr>
-              <a:t> </a:t>
-            </a:r>
-            <a:r>
-              <a:rPr lang="pt-BR" sz="2400" err="1">
-                <a:latin typeface="Arial"/>
-                <a:ea typeface="Calibri"/>
-                <a:cs typeface="Calibri"/>
-              </a:rPr>
-              <a:t>have</a:t>
-            </a:r>
-            <a:r>
-              <a:rPr lang="pt-BR" sz="2400" dirty="0">
-                <a:latin typeface="Arial"/>
-                <a:ea typeface="Calibri"/>
-                <a:cs typeface="Calibri"/>
-              </a:rPr>
-              <a:t>. </a:t>
-            </a:r>
-            <a:r>
-              <a:rPr lang="pt-BR" sz="2400" err="1">
-                <a:latin typeface="Arial"/>
-                <a:ea typeface="Calibri"/>
-                <a:cs typeface="Calibri"/>
-              </a:rPr>
-              <a:t>With</a:t>
-            </a:r>
-            <a:r>
-              <a:rPr lang="pt-BR" sz="2400" dirty="0">
-                <a:latin typeface="Arial"/>
-                <a:ea typeface="Calibri"/>
-                <a:cs typeface="Calibri"/>
-              </a:rPr>
-              <a:t> </a:t>
-            </a:r>
-            <a:r>
-              <a:rPr lang="pt-BR" sz="2400" err="1">
-                <a:latin typeface="Arial"/>
-                <a:ea typeface="Calibri"/>
-                <a:cs typeface="Calibri"/>
-              </a:rPr>
-              <a:t>that</a:t>
-            </a:r>
-            <a:r>
-              <a:rPr lang="pt-BR" sz="2400">
-                <a:latin typeface="Arial"/>
-                <a:ea typeface="Calibri"/>
-                <a:cs typeface="Calibri"/>
-              </a:rPr>
-              <a:t>, 0.89 points </a:t>
-            </a:r>
-            <a:r>
-              <a:rPr lang="pt-BR" sz="2400" err="1">
-                <a:latin typeface="Arial"/>
-                <a:ea typeface="Calibri"/>
-                <a:cs typeface="Calibri"/>
-              </a:rPr>
-              <a:t>up</a:t>
-            </a:r>
-            <a:r>
-              <a:rPr lang="pt-BR" sz="2400">
-                <a:latin typeface="Arial"/>
-                <a:ea typeface="Calibri"/>
-                <a:cs typeface="Calibri"/>
-              </a:rPr>
-              <a:t> or down </a:t>
+              <a:t>Fig. 6.1 - GUI</a:t>
             </a:r>
             <a:endParaRPr lang="pt-BR" sz="2400" dirty="0">
               <a:latin typeface="Arial"/>
-              <a:ea typeface="Calibri"/>
-              <a:cs typeface="Calibri"/>
+              <a:cs typeface="Arial"/>
             </a:endParaRPr>
           </a:p>
         </p:txBody>

</xml_diff>

<commit_message>
Exclusion of unnecessary files + Update on Poster
</commit_message>
<xml_diff>
--- a/Documentation/Capstone Project - Poster.pptx
+++ b/Documentation/Capstone Project - Poster.pptx
@@ -198,10 +198,7 @@
 <p1510:revInfo xmlns:a="http://schemas.openxmlformats.org/drawingml/2006/main" xmlns:r="http://schemas.openxmlformats.org/officeDocument/2006/relationships" xmlns:p1510="http://schemas.microsoft.com/office/powerpoint/2015/10/main">
   <p1510:revLst>
     <p1510:client id="{1CFC6E96-CD92-DB7E-9D97-D911CCA9C7FA}" v="4704" dt="2024-05-11T23:09:59.335"/>
-    <p1510:client id="{4F9C0DA7-252C-B555-86BC-A86E3FD9C9EE}" v="189" dt="2024-05-10T11:34:28.435"/>
-    <p1510:client id="{53463F5A-0479-804E-3D88-BB5129ECB863}" v="151" dt="2024-05-10T01:14:26.736"/>
-    <p1510:client id="{B23F6A55-9272-0C13-A53B-F52E05C60F66}" v="3053" dt="2024-05-10T17:07:12.593"/>
-    <p1510:client id="{BF0A896C-3CB8-168F-2290-1D6291211CBC}" v="520" dt="2024-05-09T23:28:30.591"/>
+    <p1510:client id="{CEA858CD-CA47-587B-678A-1C5E2B75AB1A}" v="20" dt="2024-05-13T14:12:42.245"/>
   </p1510:revLst>
 </p1510:revInfo>
 </file>
@@ -856,6 +853,38 @@
     </pc:docChg>
   </pc:docChgLst>
   <pc:docChgLst>
+    <pc:chgData name="Ingrid Castro" userId="73b8d72571d56733" providerId="Windows Live" clId="Web-{CEA858CD-CA47-587B-678A-1C5E2B75AB1A}"/>
+    <pc:docChg chg="modSld">
+      <pc:chgData name="Ingrid Castro" userId="73b8d72571d56733" providerId="Windows Live" clId="Web-{CEA858CD-CA47-587B-678A-1C5E2B75AB1A}" dt="2024-05-13T14:12:42.245" v="9" actId="1076"/>
+      <pc:docMkLst>
+        <pc:docMk/>
+      </pc:docMkLst>
+      <pc:sldChg chg="modSp">
+        <pc:chgData name="Ingrid Castro" userId="73b8d72571d56733" providerId="Windows Live" clId="Web-{CEA858CD-CA47-587B-678A-1C5E2B75AB1A}" dt="2024-05-13T14:12:42.245" v="9" actId="1076"/>
+        <pc:sldMkLst>
+          <pc:docMk/>
+          <pc:sldMk cId="3160527046" sldId="258"/>
+        </pc:sldMkLst>
+        <pc:spChg chg="mod">
+          <ac:chgData name="Ingrid Castro" userId="73b8d72571d56733" providerId="Windows Live" clId="Web-{CEA858CD-CA47-587B-678A-1C5E2B75AB1A}" dt="2024-05-13T14:12:30.338" v="7" actId="20577"/>
+          <ac:spMkLst>
+            <pc:docMk/>
+            <pc:sldMk cId="3160527046" sldId="258"/>
+            <ac:spMk id="40" creationId="{00000000-0000-0000-0000-000000000000}"/>
+          </ac:spMkLst>
+        </pc:spChg>
+        <pc:picChg chg="mod">
+          <ac:chgData name="Ingrid Castro" userId="73b8d72571d56733" providerId="Windows Live" clId="Web-{CEA858CD-CA47-587B-678A-1C5E2B75AB1A}" dt="2024-05-13T14:12:42.245" v="9" actId="1076"/>
+          <ac:picMkLst>
+            <pc:docMk/>
+            <pc:sldMk cId="3160527046" sldId="258"/>
+            <ac:picMk id="26" creationId="{2F68D4EE-63B4-B304-F1DF-2719624F6DC5}"/>
+          </ac:picMkLst>
+        </pc:picChg>
+      </pc:sldChg>
+    </pc:docChg>
+  </pc:docChgLst>
+  <pc:docChgLst>
     <pc:chgData name="Ingrid Castro" userId="73b8d72571d56733" providerId="Windows Live" clId="Web-{53463F5A-0479-804E-3D88-BB5129ECB863}"/>
     <pc:docChg chg="modSld">
       <pc:chgData name="Ingrid Castro" userId="73b8d72571d56733" providerId="Windows Live" clId="Web-{53463F5A-0479-804E-3D88-BB5129ECB863}" dt="2024-05-10T01:14:26.736" v="119" actId="1076"/>
@@ -1005,7 +1034,7 @@
             <a:fld id="{0158C5BC-9A70-462C-B28D-9600239EAC64}" type="datetimeFigureOut">
               <a:rPr lang="en-US" smtClean="0"/>
               <a:pPr/>
-              <a:t>5/11/2024</a:t>
+              <a:t>5/13/2024</a:t>
             </a:fld>
             <a:endParaRPr lang="en-US"/>
           </a:p>
@@ -1072,7 +1101,7 @@
             <a:fld id="{79C131B7-05CA-4AEE-9267-6D0ED4DC84F3}" type="slidenum">
               <a:rPr lang="en-US" smtClean="0"/>
               <a:pPr/>
-              <a:t>‹nº›</a:t>
+              <a:t>‹#›</a:t>
             </a:fld>
             <a:endParaRPr lang="en-US"/>
           </a:p>
@@ -1172,7 +1201,7 @@
             <a:fld id="{E6CC2317-6751-4CD4-9995-8782DD78E936}" type="datetimeFigureOut">
               <a:rPr lang="en-US" smtClean="0"/>
               <a:pPr/>
-              <a:t>5/11/2024</a:t>
+              <a:t>5/13/2024</a:t>
             </a:fld>
             <a:endParaRPr lang="en-US" dirty="0"/>
           </a:p>
@@ -1333,7 +1362,7 @@
             <a:fld id="{26A1A87D-CAF7-4BDC-A0D3-C0DBEDE81619}" type="slidenum">
               <a:rPr lang="en-US" smtClean="0"/>
               <a:pPr/>
-              <a:t>‹nº›</a:t>
+              <a:t>‹#›</a:t>
             </a:fld>
             <a:endParaRPr lang="en-US" dirty="0"/>
           </a:p>
@@ -15866,7 +15895,7 @@
                 <a:latin typeface="Arial"/>
                 <a:cs typeface="Arial"/>
               </a:rPr>
-              <a:t>RESEARCH OBJECTIVES</a:t>
+              <a:t>PROJECT OBJECTIVES</a:t>
             </a:r>
             <a:endParaRPr lang="en-US" dirty="0">
               <a:solidFill>
@@ -18231,8 +18260,8 @@
         </p:blipFill>
         <p:spPr>
           <a:xfrm>
-            <a:off x="33812492" y="17818489"/>
-            <a:ext cx="9201869" cy="6477179"/>
+            <a:off x="33867632" y="18232036"/>
+            <a:ext cx="8981310" cy="6201481"/>
           </a:xfrm>
           <a:prstGeom prst="rect">
             <a:avLst/>

</xml_diff>